<commit_message>
updated presentation file, added additional notebooks and visualizations
</commit_message>
<xml_diff>
--- a/Final Presentation.pptx
+++ b/Final Presentation.pptx
@@ -5,19 +5,22 @@
     <p:sldMasterId id="2147483648" r:id="rId1"/>
   </p:sldMasterIdLst>
   <p:notesMasterIdLst>
-    <p:notesMasterId r:id="rId9"/>
+    <p:notesMasterId r:id="rId12"/>
   </p:notesMasterIdLst>
   <p:handoutMasterIdLst>
-    <p:handoutMasterId r:id="rId10"/>
+    <p:handoutMasterId r:id="rId13"/>
   </p:handoutMasterIdLst>
   <p:sldIdLst>
     <p:sldId id="256" r:id="rId2"/>
     <p:sldId id="257" r:id="rId3"/>
     <p:sldId id="258" r:id="rId4"/>
     <p:sldId id="259" r:id="rId5"/>
-    <p:sldId id="260" r:id="rId6"/>
-    <p:sldId id="261" r:id="rId7"/>
-    <p:sldId id="262" r:id="rId8"/>
+    <p:sldId id="263" r:id="rId6"/>
+    <p:sldId id="260" r:id="rId7"/>
+    <p:sldId id="264" r:id="rId8"/>
+    <p:sldId id="265" r:id="rId9"/>
+    <p:sldId id="261" r:id="rId10"/>
+    <p:sldId id="262" r:id="rId11"/>
   </p:sldIdLst>
   <p:sldSz cx="9144000" cy="6858000" type="screen4x3"/>
   <p:notesSz cx="6858000" cy="9144000"/>
@@ -182,9 +185,279 @@
 <file path=ppt/revisionInfo.xml><?xml version="1.0" encoding="utf-8"?>
 <p1510:revInfo xmlns:a="http://schemas.openxmlformats.org/drawingml/2006/main" xmlns:r="http://schemas.openxmlformats.org/officeDocument/2006/relationships" xmlns:p1510="http://schemas.microsoft.com/office/powerpoint/2015/10/main">
   <p1510:revLst>
-    <p1510:client id="{CBBADD0F-1141-449F-A723-60BA6F36D369}" v="8" dt="2021-03-19T01:07:06.912"/>
+    <p1510:client id="{2E0CFDC0-95C9-4FE6-BC38-E1D577F00D7F}" v="5" dt="2021-03-21T03:06:42.792"/>
   </p1510:revLst>
 </p1510:revInfo>
+</file>
+
+<file path=ppt/changesInfos/changesInfo1.xml><?xml version="1.0" encoding="utf-8"?>
+<pc:chgInfo xmlns:a="http://schemas.openxmlformats.org/drawingml/2006/main" xmlns:r="http://schemas.openxmlformats.org/officeDocument/2006/relationships" xmlns:ac="http://schemas.microsoft.com/office/drawing/2013/main/command" xmlns:pc="http://schemas.microsoft.com/office/powerpoint/2013/main/command">
+  <pc:docChgLst>
+    <pc:chgData name="David Fashbinder" userId="ed5d1e420f1dc8e1" providerId="LiveId" clId="{2E0CFDC0-95C9-4FE6-BC38-E1D577F00D7F}"/>
+    <pc:docChg chg="undo custSel addSld delSld modSld sldOrd">
+      <pc:chgData name="David Fashbinder" userId="ed5d1e420f1dc8e1" providerId="LiveId" clId="{2E0CFDC0-95C9-4FE6-BC38-E1D577F00D7F}" dt="2021-03-21T03:10:43.425" v="3106" actId="20577"/>
+      <pc:docMkLst>
+        <pc:docMk/>
+      </pc:docMkLst>
+      <pc:sldChg chg="modSp mod">
+        <pc:chgData name="David Fashbinder" userId="ed5d1e420f1dc8e1" providerId="LiveId" clId="{2E0CFDC0-95C9-4FE6-BC38-E1D577F00D7F}" dt="2021-03-21T00:19:57.177" v="472" actId="1076"/>
+        <pc:sldMkLst>
+          <pc:docMk/>
+          <pc:sldMk cId="2451309673" sldId="260"/>
+        </pc:sldMkLst>
+        <pc:spChg chg="mod">
+          <ac:chgData name="David Fashbinder" userId="ed5d1e420f1dc8e1" providerId="LiveId" clId="{2E0CFDC0-95C9-4FE6-BC38-E1D577F00D7F}" dt="2021-03-21T00:19:57.177" v="472" actId="1076"/>
+          <ac:spMkLst>
+            <pc:docMk/>
+            <pc:sldMk cId="2451309673" sldId="260"/>
+            <ac:spMk id="5" creationId="{FB63DDC3-5106-4F4D-927C-6A304FF9F026}"/>
+          </ac:spMkLst>
+        </pc:spChg>
+        <pc:spChg chg="mod">
+          <ac:chgData name="David Fashbinder" userId="ed5d1e420f1dc8e1" providerId="LiveId" clId="{2E0CFDC0-95C9-4FE6-BC38-E1D577F00D7F}" dt="2021-03-21T00:05:11.439" v="21" actId="20577"/>
+          <ac:spMkLst>
+            <pc:docMk/>
+            <pc:sldMk cId="2451309673" sldId="260"/>
+            <ac:spMk id="114690" creationId="{00000000-0000-0000-0000-000000000000}"/>
+          </ac:spMkLst>
+        </pc:spChg>
+        <pc:spChg chg="mod">
+          <ac:chgData name="David Fashbinder" userId="ed5d1e420f1dc8e1" providerId="LiveId" clId="{2E0CFDC0-95C9-4FE6-BC38-E1D577F00D7F}" dt="2021-03-21T00:19:34.962" v="468" actId="255"/>
+          <ac:spMkLst>
+            <pc:docMk/>
+            <pc:sldMk cId="2451309673" sldId="260"/>
+            <ac:spMk id="114691" creationId="{00000000-0000-0000-0000-000000000000}"/>
+          </ac:spMkLst>
+        </pc:spChg>
+        <pc:picChg chg="mod">
+          <ac:chgData name="David Fashbinder" userId="ed5d1e420f1dc8e1" providerId="LiveId" clId="{2E0CFDC0-95C9-4FE6-BC38-E1D577F00D7F}" dt="2021-03-21T00:19:50.281" v="471" actId="1076"/>
+          <ac:picMkLst>
+            <pc:docMk/>
+            <pc:sldMk cId="2451309673" sldId="260"/>
+            <ac:picMk id="3" creationId="{396D86CA-8E09-4A98-81FD-AA61F471FB07}"/>
+          </ac:picMkLst>
+        </pc:picChg>
+      </pc:sldChg>
+      <pc:sldChg chg="delSp modSp mod">
+        <pc:chgData name="David Fashbinder" userId="ed5d1e420f1dc8e1" providerId="LiveId" clId="{2E0CFDC0-95C9-4FE6-BC38-E1D577F00D7F}" dt="2021-03-21T02:18:20.097" v="2078" actId="1076"/>
+        <pc:sldMkLst>
+          <pc:docMk/>
+          <pc:sldMk cId="1211891194" sldId="261"/>
+        </pc:sldMkLst>
+        <pc:spChg chg="del mod">
+          <ac:chgData name="David Fashbinder" userId="ed5d1e420f1dc8e1" providerId="LiveId" clId="{2E0CFDC0-95C9-4FE6-BC38-E1D577F00D7F}" dt="2021-03-21T02:09:35.584" v="1514"/>
+          <ac:spMkLst>
+            <pc:docMk/>
+            <pc:sldMk cId="1211891194" sldId="261"/>
+            <ac:spMk id="4" creationId="{129137F0-217C-400B-B5D8-7EA6493D90B5}"/>
+          </ac:spMkLst>
+        </pc:spChg>
+        <pc:spChg chg="mod">
+          <ac:chgData name="David Fashbinder" userId="ed5d1e420f1dc8e1" providerId="LiveId" clId="{2E0CFDC0-95C9-4FE6-BC38-E1D577F00D7F}" dt="2021-03-21T02:18:13.782" v="2077" actId="1076"/>
+          <ac:spMkLst>
+            <pc:docMk/>
+            <pc:sldMk cId="1211891194" sldId="261"/>
+            <ac:spMk id="5" creationId="{27FDFBF3-BDE4-42DA-89EF-652788DF2A14}"/>
+          </ac:spMkLst>
+        </pc:spChg>
+        <pc:picChg chg="mod">
+          <ac:chgData name="David Fashbinder" userId="ed5d1e420f1dc8e1" providerId="LiveId" clId="{2E0CFDC0-95C9-4FE6-BC38-E1D577F00D7F}" dt="2021-03-21T02:18:20.097" v="2078" actId="1076"/>
+          <ac:picMkLst>
+            <pc:docMk/>
+            <pc:sldMk cId="1211891194" sldId="261"/>
+            <ac:picMk id="3" creationId="{D2F2E2CE-20C7-4D97-B37B-E32164BFD9BA}"/>
+          </ac:picMkLst>
+        </pc:picChg>
+      </pc:sldChg>
+      <pc:sldChg chg="delSp modSp mod">
+        <pc:chgData name="David Fashbinder" userId="ed5d1e420f1dc8e1" providerId="LiveId" clId="{2E0CFDC0-95C9-4FE6-BC38-E1D577F00D7F}" dt="2021-03-21T02:22:27.880" v="2101" actId="1076"/>
+        <pc:sldMkLst>
+          <pc:docMk/>
+          <pc:sldMk cId="3272326956" sldId="262"/>
+        </pc:sldMkLst>
+        <pc:spChg chg="mod">
+          <ac:chgData name="David Fashbinder" userId="ed5d1e420f1dc8e1" providerId="LiveId" clId="{2E0CFDC0-95C9-4FE6-BC38-E1D577F00D7F}" dt="2021-03-21T02:22:13.682" v="2097" actId="1076"/>
+          <ac:spMkLst>
+            <pc:docMk/>
+            <pc:sldMk cId="3272326956" sldId="262"/>
+            <ac:spMk id="2" creationId="{690B3770-BB54-4B16-B2BB-A1F0F3734539}"/>
+          </ac:spMkLst>
+        </pc:spChg>
+        <pc:spChg chg="mod">
+          <ac:chgData name="David Fashbinder" userId="ed5d1e420f1dc8e1" providerId="LiveId" clId="{2E0CFDC0-95C9-4FE6-BC38-E1D577F00D7F}" dt="2021-03-21T02:21:58.130" v="2096" actId="1076"/>
+          <ac:spMkLst>
+            <pc:docMk/>
+            <pc:sldMk cId="3272326956" sldId="262"/>
+            <ac:spMk id="4" creationId="{129137F0-217C-400B-B5D8-7EA6493D90B5}"/>
+          </ac:spMkLst>
+        </pc:spChg>
+        <pc:spChg chg="mod">
+          <ac:chgData name="David Fashbinder" userId="ed5d1e420f1dc8e1" providerId="LiveId" clId="{2E0CFDC0-95C9-4FE6-BC38-E1D577F00D7F}" dt="2021-03-21T02:22:20.942" v="2098" actId="1076"/>
+          <ac:spMkLst>
+            <pc:docMk/>
+            <pc:sldMk cId="3272326956" sldId="262"/>
+            <ac:spMk id="7" creationId="{31019992-6E6F-463B-9DEB-A73AAE25A9E6}"/>
+          </ac:spMkLst>
+        </pc:spChg>
+        <pc:spChg chg="mod">
+          <ac:chgData name="David Fashbinder" userId="ed5d1e420f1dc8e1" providerId="LiveId" clId="{2E0CFDC0-95C9-4FE6-BC38-E1D577F00D7F}" dt="2021-03-21T02:22:27.880" v="2101" actId="1076"/>
+          <ac:spMkLst>
+            <pc:docMk/>
+            <pc:sldMk cId="3272326956" sldId="262"/>
+            <ac:spMk id="9" creationId="{4C89C8A8-819D-448A-ADF7-50DE7253582F}"/>
+          </ac:spMkLst>
+        </pc:spChg>
+        <pc:spChg chg="del mod">
+          <ac:chgData name="David Fashbinder" userId="ed5d1e420f1dc8e1" providerId="LiveId" clId="{2E0CFDC0-95C9-4FE6-BC38-E1D577F00D7F}" dt="2021-03-21T02:22:24.474" v="2100" actId="478"/>
+          <ac:spMkLst>
+            <pc:docMk/>
+            <pc:sldMk cId="3272326956" sldId="262"/>
+            <ac:spMk id="11" creationId="{D1EF8E3F-080C-4D07-9506-1B5F3B668109}"/>
+          </ac:spMkLst>
+        </pc:spChg>
+        <pc:picChg chg="mod">
+          <ac:chgData name="David Fashbinder" userId="ed5d1e420f1dc8e1" providerId="LiveId" clId="{2E0CFDC0-95C9-4FE6-BC38-E1D577F00D7F}" dt="2021-03-21T02:21:47.983" v="2094" actId="1076"/>
+          <ac:picMkLst>
+            <pc:docMk/>
+            <pc:sldMk cId="3272326956" sldId="262"/>
+            <ac:picMk id="10" creationId="{6EEDDBEC-22A1-4F52-BE7D-A8E79FACD3A4}"/>
+          </ac:picMkLst>
+        </pc:picChg>
+      </pc:sldChg>
+      <pc:sldChg chg="delSp modSp add mod ord">
+        <pc:chgData name="David Fashbinder" userId="ed5d1e420f1dc8e1" providerId="LiveId" clId="{2E0CFDC0-95C9-4FE6-BC38-E1D577F00D7F}" dt="2021-03-21T01:31:13.739" v="475"/>
+        <pc:sldMkLst>
+          <pc:docMk/>
+          <pc:sldMk cId="757917783" sldId="263"/>
+        </pc:sldMkLst>
+        <pc:spChg chg="del mod">
+          <ac:chgData name="David Fashbinder" userId="ed5d1e420f1dc8e1" providerId="LiveId" clId="{2E0CFDC0-95C9-4FE6-BC38-E1D577F00D7F}" dt="2021-03-21T00:08:34.801" v="56" actId="478"/>
+          <ac:spMkLst>
+            <pc:docMk/>
+            <pc:sldMk cId="757917783" sldId="263"/>
+            <ac:spMk id="5" creationId="{FB63DDC3-5106-4F4D-927C-6A304FF9F026}"/>
+          </ac:spMkLst>
+        </pc:spChg>
+        <pc:spChg chg="mod">
+          <ac:chgData name="David Fashbinder" userId="ed5d1e420f1dc8e1" providerId="LiveId" clId="{2E0CFDC0-95C9-4FE6-BC38-E1D577F00D7F}" dt="2021-03-21T00:05:22.895" v="45" actId="20577"/>
+          <ac:spMkLst>
+            <pc:docMk/>
+            <pc:sldMk cId="757917783" sldId="263"/>
+            <ac:spMk id="114690" creationId="{00000000-0000-0000-0000-000000000000}"/>
+          </ac:spMkLst>
+        </pc:spChg>
+        <pc:spChg chg="mod">
+          <ac:chgData name="David Fashbinder" userId="ed5d1e420f1dc8e1" providerId="LiveId" clId="{2E0CFDC0-95C9-4FE6-BC38-E1D577F00D7F}" dt="2021-03-21T00:20:14.938" v="473" actId="255"/>
+          <ac:spMkLst>
+            <pc:docMk/>
+            <pc:sldMk cId="757917783" sldId="263"/>
+            <ac:spMk id="114691" creationId="{00000000-0000-0000-0000-000000000000}"/>
+          </ac:spMkLst>
+        </pc:spChg>
+        <pc:picChg chg="del">
+          <ac:chgData name="David Fashbinder" userId="ed5d1e420f1dc8e1" providerId="LiveId" clId="{2E0CFDC0-95C9-4FE6-BC38-E1D577F00D7F}" dt="2021-03-21T00:08:32.656" v="54" actId="478"/>
+          <ac:picMkLst>
+            <pc:docMk/>
+            <pc:sldMk cId="757917783" sldId="263"/>
+            <ac:picMk id="3" creationId="{396D86CA-8E09-4A98-81FD-AA61F471FB07}"/>
+          </ac:picMkLst>
+        </pc:picChg>
+      </pc:sldChg>
+      <pc:sldChg chg="modSp new add del mod">
+        <pc:chgData name="David Fashbinder" userId="ed5d1e420f1dc8e1" providerId="LiveId" clId="{2E0CFDC0-95C9-4FE6-BC38-E1D577F00D7F}" dt="2021-03-21T01:44:33.663" v="503" actId="680"/>
+        <pc:sldMkLst>
+          <pc:docMk/>
+          <pc:sldMk cId="2369347665" sldId="264"/>
+        </pc:sldMkLst>
+        <pc:spChg chg="mod">
+          <ac:chgData name="David Fashbinder" userId="ed5d1e420f1dc8e1" providerId="LiveId" clId="{2E0CFDC0-95C9-4FE6-BC38-E1D577F00D7F}" dt="2021-03-21T01:44:33.291" v="502" actId="20577"/>
+          <ac:spMkLst>
+            <pc:docMk/>
+            <pc:sldMk cId="2369347665" sldId="264"/>
+            <ac:spMk id="2" creationId="{1026841A-8B7F-43DE-BB75-34FC0B2F4841}"/>
+          </ac:spMkLst>
+        </pc:spChg>
+      </pc:sldChg>
+      <pc:sldChg chg="delSp modSp add mod">
+        <pc:chgData name="David Fashbinder" userId="ed5d1e420f1dc8e1" providerId="LiveId" clId="{2E0CFDC0-95C9-4FE6-BC38-E1D577F00D7F}" dt="2021-03-21T01:56:19.603" v="1511" actId="20577"/>
+        <pc:sldMkLst>
+          <pc:docMk/>
+          <pc:sldMk cId="3183832843" sldId="264"/>
+        </pc:sldMkLst>
+        <pc:spChg chg="del">
+          <ac:chgData name="David Fashbinder" userId="ed5d1e420f1dc8e1" providerId="LiveId" clId="{2E0CFDC0-95C9-4FE6-BC38-E1D577F00D7F}" dt="2021-03-21T01:45:01.165" v="592" actId="478"/>
+          <ac:spMkLst>
+            <pc:docMk/>
+            <pc:sldMk cId="3183832843" sldId="264"/>
+            <ac:spMk id="5" creationId="{FB63DDC3-5106-4F4D-927C-6A304FF9F026}"/>
+          </ac:spMkLst>
+        </pc:spChg>
+        <pc:spChg chg="mod">
+          <ac:chgData name="David Fashbinder" userId="ed5d1e420f1dc8e1" providerId="LiveId" clId="{2E0CFDC0-95C9-4FE6-BC38-E1D577F00D7F}" dt="2021-03-21T01:44:41.517" v="520" actId="20577"/>
+          <ac:spMkLst>
+            <pc:docMk/>
+            <pc:sldMk cId="3183832843" sldId="264"/>
+            <ac:spMk id="114690" creationId="{00000000-0000-0000-0000-000000000000}"/>
+          </ac:spMkLst>
+        </pc:spChg>
+        <pc:spChg chg="mod">
+          <ac:chgData name="David Fashbinder" userId="ed5d1e420f1dc8e1" providerId="LiveId" clId="{2E0CFDC0-95C9-4FE6-BC38-E1D577F00D7F}" dt="2021-03-21T01:56:19.603" v="1511" actId="20577"/>
+          <ac:spMkLst>
+            <pc:docMk/>
+            <pc:sldMk cId="3183832843" sldId="264"/>
+            <ac:spMk id="114691" creationId="{00000000-0000-0000-0000-000000000000}"/>
+          </ac:spMkLst>
+        </pc:spChg>
+        <pc:picChg chg="del">
+          <ac:chgData name="David Fashbinder" userId="ed5d1e420f1dc8e1" providerId="LiveId" clId="{2E0CFDC0-95C9-4FE6-BC38-E1D577F00D7F}" dt="2021-03-21T01:44:59.785" v="591" actId="478"/>
+          <ac:picMkLst>
+            <pc:docMk/>
+            <pc:sldMk cId="3183832843" sldId="264"/>
+            <ac:picMk id="3" creationId="{396D86CA-8E09-4A98-81FD-AA61F471FB07}"/>
+          </ac:picMkLst>
+        </pc:picChg>
+      </pc:sldChg>
+      <pc:sldChg chg="add del setBg">
+        <pc:chgData name="David Fashbinder" userId="ed5d1e420f1dc8e1" providerId="LiveId" clId="{2E0CFDC0-95C9-4FE6-BC38-E1D577F00D7F}" dt="2021-03-21T01:44:30.803" v="499"/>
+        <pc:sldMkLst>
+          <pc:docMk/>
+          <pc:sldMk cId="668279819" sldId="265"/>
+        </pc:sldMkLst>
+      </pc:sldChg>
+      <pc:sldChg chg="addSp delSp modSp add mod">
+        <pc:chgData name="David Fashbinder" userId="ed5d1e420f1dc8e1" providerId="LiveId" clId="{2E0CFDC0-95C9-4FE6-BC38-E1D577F00D7F}" dt="2021-03-21T03:10:43.425" v="3106" actId="20577"/>
+        <pc:sldMkLst>
+          <pc:docMk/>
+          <pc:sldMk cId="1743503932" sldId="265"/>
+        </pc:sldMkLst>
+        <pc:spChg chg="mod">
+          <ac:chgData name="David Fashbinder" userId="ed5d1e420f1dc8e1" providerId="LiveId" clId="{2E0CFDC0-95C9-4FE6-BC38-E1D577F00D7F}" dt="2021-03-21T03:10:43.425" v="3106" actId="20577"/>
+          <ac:spMkLst>
+            <pc:docMk/>
+            <pc:sldMk cId="1743503932" sldId="265"/>
+            <ac:spMk id="5" creationId="{27FDFBF3-BDE4-42DA-89EF-652788DF2A14}"/>
+          </ac:spMkLst>
+        </pc:spChg>
+        <pc:picChg chg="del">
+          <ac:chgData name="David Fashbinder" userId="ed5d1e420f1dc8e1" providerId="LiveId" clId="{2E0CFDC0-95C9-4FE6-BC38-E1D577F00D7F}" dt="2021-03-21T03:06:34.725" v="2452" actId="478"/>
+          <ac:picMkLst>
+            <pc:docMk/>
+            <pc:sldMk cId="1743503932" sldId="265"/>
+            <ac:picMk id="3" creationId="{D2F2E2CE-20C7-4D97-B37B-E32164BFD9BA}"/>
+          </ac:picMkLst>
+        </pc:picChg>
+        <pc:picChg chg="add mod">
+          <ac:chgData name="David Fashbinder" userId="ed5d1e420f1dc8e1" providerId="LiveId" clId="{2E0CFDC0-95C9-4FE6-BC38-E1D577F00D7F}" dt="2021-03-21T03:06:42.792" v="2454" actId="1076"/>
+          <ac:picMkLst>
+            <pc:docMk/>
+            <pc:sldMk cId="1743503932" sldId="265"/>
+            <ac:picMk id="1026" creationId="{A14FFD17-C31F-484D-8664-997C28C2DDE3}"/>
+          </ac:picMkLst>
+        </pc:picChg>
+      </pc:sldChg>
+    </pc:docChg>
+  </pc:docChgLst>
+</pc:chgInfo>
 </file>
 
 <file path=ppt/handoutMasters/handoutMaster1.xml><?xml version="1.0" encoding="utf-8"?>
@@ -812,7 +1085,7 @@
               <a:pPr>
                 <a:defRPr/>
               </a:pPr>
-              <a:t>6</a:t>
+              <a:t>8</a:t>
             </a:fld>
             <a:endParaRPr lang="ru-RU"/>
           </a:p>
@@ -821,7 +1094,7 @@
     </p:spTree>
     <p:extLst>
       <p:ext uri="{BB962C8B-B14F-4D97-AF65-F5344CB8AC3E}">
-        <p14:creationId xmlns:p14="http://schemas.microsoft.com/office/powerpoint/2010/main" val="4275734735"/>
+        <p14:creationId xmlns:p14="http://schemas.microsoft.com/office/powerpoint/2010/main" val="369182686"/>
       </p:ext>
     </p:extLst>
   </p:cSld>
@@ -916,7 +1189,111 @@
               <a:pPr>
                 <a:defRPr/>
               </a:pPr>
-              <a:t>7</a:t>
+              <a:t>9</a:t>
+            </a:fld>
+            <a:endParaRPr lang="ru-RU"/>
+          </a:p>
+        </p:txBody>
+      </p:sp>
+    </p:spTree>
+    <p:extLst>
+      <p:ext uri="{BB962C8B-B14F-4D97-AF65-F5344CB8AC3E}">
+        <p14:creationId xmlns:p14="http://schemas.microsoft.com/office/powerpoint/2010/main" val="4275734735"/>
+      </p:ext>
+    </p:extLst>
+  </p:cSld>
+  <p:clrMapOvr>
+    <a:masterClrMapping/>
+  </p:clrMapOvr>
+</p:notes>
+</file>
+
+<file path=ppt/notesSlides/notesSlide4.xml><?xml version="1.0" encoding="utf-8"?>
+<p:notes xmlns:a="http://schemas.openxmlformats.org/drawingml/2006/main" xmlns:r="http://schemas.openxmlformats.org/officeDocument/2006/relationships" xmlns:p="http://schemas.openxmlformats.org/presentationml/2006/main">
+  <p:cSld>
+    <p:spTree>
+      <p:nvGrpSpPr>
+        <p:cNvPr id="1" name=""/>
+        <p:cNvGrpSpPr/>
+        <p:nvPr/>
+      </p:nvGrpSpPr>
+      <p:grpSpPr>
+        <a:xfrm>
+          <a:off x="0" y="0"/>
+          <a:ext cx="0" cy="0"/>
+          <a:chOff x="0" y="0"/>
+          <a:chExt cx="0" cy="0"/>
+        </a:xfrm>
+      </p:grpSpPr>
+      <p:sp>
+        <p:nvSpPr>
+          <p:cNvPr id="2" name="Slide Image Placeholder 1"/>
+          <p:cNvSpPr>
+            <a:spLocks noGrp="1" noRot="1" noChangeAspect="1"/>
+          </p:cNvSpPr>
+          <p:nvPr>
+            <p:ph type="sldImg"/>
+          </p:nvPr>
+        </p:nvSpPr>
+        <p:spPr>
+          <a:xfrm>
+            <a:off x="1371600" y="1143000"/>
+            <a:ext cx="4114800" cy="3086100"/>
+          </a:xfrm>
+          <a:prstGeom prst="rect">
+            <a:avLst/>
+          </a:prstGeom>
+          <a:noFill/>
+          <a:ln w="12700">
+            <a:solidFill>
+              <a:prstClr val="black"/>
+            </a:solidFill>
+          </a:ln>
+        </p:spPr>
+      </p:sp>
+      <p:sp>
+        <p:nvSpPr>
+          <p:cNvPr id="3" name="Notes Placeholder 2"/>
+          <p:cNvSpPr>
+            <a:spLocks noGrp="1"/>
+          </p:cNvSpPr>
+          <p:nvPr>
+            <p:ph type="body" idx="1"/>
+          </p:nvPr>
+        </p:nvSpPr>
+        <p:spPr/>
+        <p:txBody>
+          <a:bodyPr/>
+          <a:lstStyle/>
+          <a:p>
+            <a:endParaRPr lang="en-US" dirty="0"/>
+          </a:p>
+        </p:txBody>
+      </p:sp>
+      <p:sp>
+        <p:nvSpPr>
+          <p:cNvPr id="4" name="Slide Number Placeholder 3"/>
+          <p:cNvSpPr>
+            <a:spLocks noGrp="1"/>
+          </p:cNvSpPr>
+          <p:nvPr>
+            <p:ph type="sldNum" sz="quarter" idx="5"/>
+          </p:nvPr>
+        </p:nvSpPr>
+        <p:spPr/>
+        <p:txBody>
+          <a:bodyPr/>
+          <a:lstStyle/>
+          <a:p>
+            <a:pPr>
+              <a:defRPr/>
+            </a:pPr>
+            <a:fld id="{F094C4D3-A316-43C9-85F6-B63394E24EC6}" type="slidenum">
+              <a:rPr lang="ru-RU" smtClean="0"/>
+              <a:pPr>
+                <a:defRPr/>
+              </a:pPr>
+              <a:t>10</a:t>
             </a:fld>
             <a:endParaRPr lang="ru-RU"/>
           </a:p>
@@ -3177,6 +3554,264 @@
 </p:sld>
 </file>
 
+<file path=ppt/slides/slide10.xml><?xml version="1.0" encoding="utf-8"?>
+<p:sld xmlns:a="http://schemas.openxmlformats.org/drawingml/2006/main" xmlns:r="http://schemas.openxmlformats.org/officeDocument/2006/relationships" xmlns:p="http://schemas.openxmlformats.org/presentationml/2006/main">
+  <p:cSld>
+    <p:spTree>
+      <p:nvGrpSpPr>
+        <p:cNvPr id="1" name=""/>
+        <p:cNvGrpSpPr/>
+        <p:nvPr/>
+      </p:nvGrpSpPr>
+      <p:grpSpPr>
+        <a:xfrm>
+          <a:off x="0" y="0"/>
+          <a:ext cx="0" cy="0"/>
+          <a:chOff x="0" y="0"/>
+          <a:chExt cx="0" cy="0"/>
+        </a:xfrm>
+      </p:grpSpPr>
+      <p:sp>
+        <p:nvSpPr>
+          <p:cNvPr id="4098" name="Rectangle 2"/>
+          <p:cNvSpPr>
+            <a:spLocks noGrp="1" noChangeArrowheads="1"/>
+          </p:cNvSpPr>
+          <p:nvPr>
+            <p:ph type="title"/>
+          </p:nvPr>
+        </p:nvSpPr>
+        <p:spPr>
+          <a:xfrm>
+            <a:off x="2143125" y="1714500"/>
+            <a:ext cx="6480175" cy="649288"/>
+          </a:xfrm>
+        </p:spPr>
+        <p:txBody>
+          <a:bodyPr/>
+          <a:lstStyle/>
+          <a:p>
+            <a:pPr algn="r" eaLnBrk="1" hangingPunct="1"/>
+            <a:r>
+              <a:rPr lang="en" sz="2400" dirty="0">
+                <a:solidFill>
+                  <a:schemeClr val="accent2"/>
+                </a:solidFill>
+              </a:rPr>
+              <a:t>Asking Questions</a:t>
+            </a:r>
+            <a:endParaRPr lang="uk-UA" sz="3200" dirty="0">
+              <a:solidFill>
+                <a:schemeClr val="accent2"/>
+              </a:solidFill>
+            </a:endParaRPr>
+          </a:p>
+        </p:txBody>
+      </p:sp>
+      <p:sp>
+        <p:nvSpPr>
+          <p:cNvPr id="4" name="TextBox 3">
+            <a:extLst>
+              <a:ext uri="{FF2B5EF4-FFF2-40B4-BE49-F238E27FC236}">
+                <a16:creationId xmlns:a16="http://schemas.microsoft.com/office/drawing/2014/main" id="{129137F0-217C-400B-B5D8-7EA6493D90B5}"/>
+              </a:ext>
+            </a:extLst>
+          </p:cNvPr>
+          <p:cNvSpPr txBox="1"/>
+          <p:nvPr/>
+        </p:nvSpPr>
+        <p:spPr>
+          <a:xfrm>
+            <a:off x="304800" y="5089496"/>
+            <a:ext cx="3934374" cy="1569660"/>
+          </a:xfrm>
+          <a:prstGeom prst="rect">
+            <a:avLst/>
+          </a:prstGeom>
+          <a:noFill/>
+        </p:spPr>
+        <p:txBody>
+          <a:bodyPr wrap="square" rtlCol="0">
+            <a:spAutoFit/>
+          </a:bodyPr>
+          <a:lstStyle/>
+          <a:p>
+            <a:r>
+              <a:rPr lang="en-US" sz="1200" dirty="0"/>
+              <a:t>Just because SO’s are the biggest indicator that predicts salary in our model, doesn’t mean that a player with the most SO’s should earn the highest pay.  </a:t>
+            </a:r>
+          </a:p>
+          <a:p>
+            <a:endParaRPr lang="en-US" sz="1200" dirty="0"/>
+          </a:p>
+          <a:p>
+            <a:r>
+              <a:rPr lang="en-US" sz="1200" dirty="0"/>
+              <a:t>Slugging Percentage (SLG) is the reflection of Strike-Outs in the game’s highest paid players.  </a:t>
+            </a:r>
+          </a:p>
+          <a:p>
+            <a:endParaRPr lang="en-US" sz="1200" dirty="0"/>
+          </a:p>
+          <a:p>
+            <a:endParaRPr lang="en-US" sz="1200" dirty="0"/>
+          </a:p>
+        </p:txBody>
+      </p:sp>
+      <p:sp>
+        <p:nvSpPr>
+          <p:cNvPr id="2" name="TextBox 1">
+            <a:extLst>
+              <a:ext uri="{FF2B5EF4-FFF2-40B4-BE49-F238E27FC236}">
+                <a16:creationId xmlns:a16="http://schemas.microsoft.com/office/drawing/2014/main" id="{690B3770-BB54-4B16-B2BB-A1F0F3734539}"/>
+              </a:ext>
+            </a:extLst>
+          </p:cNvPr>
+          <p:cNvSpPr txBox="1"/>
+          <p:nvPr/>
+        </p:nvSpPr>
+        <p:spPr>
+          <a:xfrm>
+            <a:off x="383275" y="6289824"/>
+            <a:ext cx="3172374" cy="369332"/>
+          </a:xfrm>
+          <a:prstGeom prst="rect">
+            <a:avLst/>
+          </a:prstGeom>
+          <a:noFill/>
+        </p:spPr>
+        <p:txBody>
+          <a:bodyPr wrap="square" rtlCol="0">
+            <a:spAutoFit/>
+          </a:bodyPr>
+          <a:lstStyle/>
+          <a:p>
+            <a:r>
+              <a:rPr lang="en-US" dirty="0"/>
+              <a:t>SLG = Total Bases / At-Bats</a:t>
+            </a:r>
+          </a:p>
+        </p:txBody>
+      </p:sp>
+      <p:sp>
+        <p:nvSpPr>
+          <p:cNvPr id="7" name="TextBox 6">
+            <a:extLst>
+              <a:ext uri="{FF2B5EF4-FFF2-40B4-BE49-F238E27FC236}">
+                <a16:creationId xmlns:a16="http://schemas.microsoft.com/office/drawing/2014/main" id="{31019992-6E6F-463B-9DEB-A73AAE25A9E6}"/>
+              </a:ext>
+            </a:extLst>
+          </p:cNvPr>
+          <p:cNvSpPr txBox="1"/>
+          <p:nvPr/>
+        </p:nvSpPr>
+        <p:spPr>
+          <a:xfrm>
+            <a:off x="4410074" y="4992469"/>
+            <a:ext cx="4419600" cy="646331"/>
+          </a:xfrm>
+          <a:prstGeom prst="rect">
+            <a:avLst/>
+          </a:prstGeom>
+          <a:noFill/>
+        </p:spPr>
+        <p:txBody>
+          <a:bodyPr wrap="square" rtlCol="0">
+            <a:spAutoFit/>
+          </a:bodyPr>
+          <a:lstStyle/>
+          <a:p>
+            <a:r>
+              <a:rPr lang="en-US" dirty="0"/>
+              <a:t>Total Bases = (Singles) + (2 x Doubles) + (3 x Triples) + (4 x Home Runs)</a:t>
+            </a:r>
+          </a:p>
+        </p:txBody>
+      </p:sp>
+      <p:sp>
+        <p:nvSpPr>
+          <p:cNvPr id="9" name="TextBox 8">
+            <a:extLst>
+              <a:ext uri="{FF2B5EF4-FFF2-40B4-BE49-F238E27FC236}">
+                <a16:creationId xmlns:a16="http://schemas.microsoft.com/office/drawing/2014/main" id="{4C89C8A8-819D-448A-ADF7-50DE7253582F}"/>
+              </a:ext>
+            </a:extLst>
+          </p:cNvPr>
+          <p:cNvSpPr txBox="1"/>
+          <p:nvPr/>
+        </p:nvSpPr>
+        <p:spPr>
+          <a:xfrm>
+            <a:off x="4410074" y="5638800"/>
+            <a:ext cx="3934374" cy="1384995"/>
+          </a:xfrm>
+          <a:prstGeom prst="rect">
+            <a:avLst/>
+          </a:prstGeom>
+          <a:noFill/>
+        </p:spPr>
+        <p:txBody>
+          <a:bodyPr wrap="square" rtlCol="0">
+            <a:spAutoFit/>
+          </a:bodyPr>
+          <a:lstStyle/>
+          <a:p>
+            <a:r>
+              <a:rPr lang="en-US" sz="1200" dirty="0"/>
+              <a:t>In this scatterplot, we can see that the players on the right side – who have the most SO’s – have larger circles than the players on the left.  This means they have larger salaries.  This tracks with teams wanting to pay players with the most HR-potential large salaries.</a:t>
+            </a:r>
+          </a:p>
+          <a:p>
+            <a:endParaRPr lang="en-US" sz="1200" dirty="0"/>
+          </a:p>
+          <a:p>
+            <a:endParaRPr lang="en-US" sz="1200" dirty="0"/>
+          </a:p>
+        </p:txBody>
+      </p:sp>
+      <p:pic>
+        <p:nvPicPr>
+          <p:cNvPr id="10" name="Picture 9">
+            <a:extLst>
+              <a:ext uri="{FF2B5EF4-FFF2-40B4-BE49-F238E27FC236}">
+                <a16:creationId xmlns:a16="http://schemas.microsoft.com/office/drawing/2014/main" id="{6EEDDBEC-22A1-4F52-BE7D-A8E79FACD3A4}"/>
+              </a:ext>
+            </a:extLst>
+          </p:cNvPr>
+          <p:cNvPicPr>
+            <a:picLocks noChangeAspect="1"/>
+          </p:cNvPicPr>
+          <p:nvPr/>
+        </p:nvPicPr>
+        <p:blipFill>
+          <a:blip r:embed="rId3"/>
+          <a:stretch>
+            <a:fillRect/>
+          </a:stretch>
+        </p:blipFill>
+        <p:spPr>
+          <a:xfrm>
+            <a:off x="383275" y="2305070"/>
+            <a:ext cx="8072649" cy="2493090"/>
+          </a:xfrm>
+          <a:prstGeom prst="rect">
+            <a:avLst/>
+          </a:prstGeom>
+        </p:spPr>
+      </p:pic>
+    </p:spTree>
+    <p:extLst>
+      <p:ext uri="{BB962C8B-B14F-4D97-AF65-F5344CB8AC3E}">
+        <p14:creationId xmlns:p14="http://schemas.microsoft.com/office/powerpoint/2010/main" val="3272326956"/>
+      </p:ext>
+    </p:extLst>
+  </p:cSld>
+  <p:clrMapOvr>
+    <a:masterClrMapping/>
+  </p:clrMapOvr>
+</p:sld>
+</file>
+
 <file path=ppt/slides/slide2.xml><?xml version="1.0" encoding="utf-8"?>
 <p:sld xmlns:a="http://schemas.openxmlformats.org/drawingml/2006/main" xmlns:r="http://schemas.openxmlformats.org/officeDocument/2006/relationships" xmlns:p="http://schemas.openxmlformats.org/presentationml/2006/main">
   <p:cSld>
@@ -3662,7 +4297,7 @@
             </a:pPr>
             <a:r>
               <a:rPr lang="en" dirty="0"/>
-              <a:t>Data Exploration</a:t>
+              <a:t>Database Implementation</a:t>
             </a:r>
             <a:endParaRPr lang="en-US" dirty="0">
               <a:solidFill>
@@ -3695,6 +4330,371 @@
           <a:bodyPr/>
           <a:lstStyle/>
           <a:p>
+            <a:pPr marL="0" indent="0" algn="l">
+              <a:buNone/>
+            </a:pPr>
+            <a:r>
+              <a:rPr lang="en-US" sz="1400" b="0" i="0" dirty="0">
+                <a:solidFill>
+                  <a:srgbClr val="24292E"/>
+                </a:solidFill>
+                <a:effectLst/>
+              </a:rPr>
+              <a:t>We decided to use Postgres for our data storage because of its ease of use and our familiarity with it. This created a challenge, however, since we would need some sort of subscription service like Amazon Web Services (AWS) to host our database and allow each team member access.  </a:t>
+            </a:r>
+          </a:p>
+          <a:p>
+            <a:pPr marL="0" indent="0" algn="l">
+              <a:buNone/>
+            </a:pPr>
+            <a:endParaRPr lang="en-US" sz="1400" dirty="0">
+              <a:solidFill>
+                <a:srgbClr val="24292E"/>
+              </a:solidFill>
+            </a:endParaRPr>
+          </a:p>
+          <a:p>
+            <a:pPr marL="0" indent="0" algn="l">
+              <a:buNone/>
+            </a:pPr>
+            <a:r>
+              <a:rPr lang="en-US" sz="1400" b="0" i="0" dirty="0">
+                <a:solidFill>
+                  <a:srgbClr val="24292E"/>
+                </a:solidFill>
+                <a:effectLst/>
+              </a:rPr>
+              <a:t>The solution?  Creating duplicate databases on each of our local machines.  </a:t>
+            </a:r>
+          </a:p>
+          <a:p>
+            <a:pPr marL="0" indent="0" algn="l">
+              <a:buNone/>
+            </a:pPr>
+            <a:endParaRPr lang="en-US" sz="1400" b="0" i="0" dirty="0">
+              <a:solidFill>
+                <a:srgbClr val="24292E"/>
+              </a:solidFill>
+              <a:effectLst/>
+            </a:endParaRPr>
+          </a:p>
+          <a:p>
+            <a:pPr marL="0" indent="0" algn="l">
+              <a:buNone/>
+            </a:pPr>
+            <a:r>
+              <a:rPr lang="en-US" sz="1400" b="0" i="0" dirty="0">
+                <a:solidFill>
+                  <a:srgbClr val="24292E"/>
+                </a:solidFill>
+                <a:effectLst/>
+              </a:rPr>
+              <a:t>The Steps below outline the how we were able to setup replica Postgres Databases on each team member’s device and make a connection, so our machine learning models were able to access the data.</a:t>
+            </a:r>
+          </a:p>
+          <a:p>
+            <a:pPr marL="0" indent="0" algn="l">
+              <a:buNone/>
+            </a:pPr>
+            <a:endParaRPr lang="en-US" sz="1400" b="0" i="0" dirty="0">
+              <a:solidFill>
+                <a:srgbClr val="24292E"/>
+              </a:solidFill>
+              <a:effectLst/>
+            </a:endParaRPr>
+          </a:p>
+          <a:p>
+            <a:pPr marL="0" indent="0" algn="l">
+              <a:buNone/>
+            </a:pPr>
+            <a:r>
+              <a:rPr lang="en-US" sz="1400" dirty="0">
+                <a:solidFill>
+                  <a:srgbClr val="24292E"/>
+                </a:solidFill>
+              </a:rPr>
+              <a:t>1. Identify </a:t>
+            </a:r>
+            <a:r>
+              <a:rPr lang="en-US" sz="1400" b="0" i="0" dirty="0">
+                <a:solidFill>
+                  <a:srgbClr val="24292E"/>
+                </a:solidFill>
+                <a:effectLst/>
+              </a:rPr>
+              <a:t>the csv files we would like to use for our analysis. </a:t>
+            </a:r>
+          </a:p>
+          <a:p>
+            <a:pPr marL="0" indent="0" algn="l">
+              <a:buNone/>
+            </a:pPr>
+            <a:r>
+              <a:rPr lang="en-US" sz="1400" b="0" i="0" dirty="0">
+                <a:solidFill>
+                  <a:srgbClr val="24292E"/>
+                </a:solidFill>
+                <a:effectLst/>
+              </a:rPr>
+              <a:t>2. Import the relevant csv files into our notebook as a data frame using pandas so we could review the data. </a:t>
+            </a:r>
+          </a:p>
+          <a:p>
+            <a:pPr marL="0" indent="0" algn="l">
+              <a:buNone/>
+            </a:pPr>
+            <a:r>
+              <a:rPr lang="en-US" sz="1400" dirty="0">
+                <a:solidFill>
+                  <a:srgbClr val="24292E"/>
+                </a:solidFill>
+              </a:rPr>
+              <a:t>3. Cl</a:t>
+            </a:r>
+            <a:r>
+              <a:rPr lang="en-US" sz="1400" b="0" i="0" dirty="0">
+                <a:solidFill>
+                  <a:srgbClr val="24292E"/>
+                </a:solidFill>
+                <a:effectLst/>
+              </a:rPr>
+              <a:t>ean the data of irrelevant data columns that were of no use. </a:t>
+            </a:r>
+          </a:p>
+          <a:p>
+            <a:pPr marL="0" indent="0" algn="l">
+              <a:buNone/>
+            </a:pPr>
+            <a:r>
+              <a:rPr lang="en-US" sz="1400" dirty="0">
+                <a:solidFill>
+                  <a:srgbClr val="24292E"/>
+                </a:solidFill>
+              </a:rPr>
+              <a:t>4. </a:t>
+            </a:r>
+            <a:r>
+              <a:rPr lang="en-US" sz="1400" b="0" i="0" dirty="0">
+                <a:solidFill>
+                  <a:srgbClr val="24292E"/>
+                </a:solidFill>
+                <a:effectLst/>
+              </a:rPr>
+              <a:t>Create the connection to our Postgres database instance using </a:t>
+            </a:r>
+            <a:r>
+              <a:rPr lang="en-US" sz="1400" b="0" i="0" dirty="0" err="1">
+                <a:solidFill>
+                  <a:srgbClr val="24292E"/>
+                </a:solidFill>
+                <a:effectLst/>
+              </a:rPr>
+              <a:t>sqlAlchemy</a:t>
+            </a:r>
+            <a:r>
+              <a:rPr lang="en-US" sz="1400" b="0" i="0" dirty="0">
+                <a:solidFill>
+                  <a:srgbClr val="24292E"/>
+                </a:solidFill>
+                <a:effectLst/>
+              </a:rPr>
+              <a:t> so we can import the data into tables. </a:t>
+            </a:r>
+          </a:p>
+          <a:p>
+            <a:pPr marL="0" indent="0" algn="l">
+              <a:buNone/>
+            </a:pPr>
+            <a:r>
+              <a:rPr lang="en-US" sz="1400" dirty="0">
+                <a:solidFill>
+                  <a:srgbClr val="24292E"/>
+                </a:solidFill>
+              </a:rPr>
+              <a:t>5. </a:t>
+            </a:r>
+            <a:r>
+              <a:rPr lang="en-US" sz="1400" b="0" i="0" dirty="0">
+                <a:solidFill>
+                  <a:srgbClr val="24292E"/>
+                </a:solidFill>
+                <a:effectLst/>
+              </a:rPr>
+              <a:t>Import our partially cleaned data frames into our Postgres Database. </a:t>
+            </a:r>
+          </a:p>
+          <a:p>
+            <a:pPr marL="0" indent="0" algn="l">
+              <a:buNone/>
+            </a:pPr>
+            <a:r>
+              <a:rPr lang="en-US" sz="1400" dirty="0">
+                <a:solidFill>
+                  <a:srgbClr val="24292E"/>
+                </a:solidFill>
+              </a:rPr>
+              <a:t>6. </a:t>
+            </a:r>
+            <a:r>
+              <a:rPr lang="en-US" sz="1400" b="0" i="0" dirty="0">
+                <a:solidFill>
+                  <a:srgbClr val="24292E"/>
+                </a:solidFill>
+                <a:effectLst/>
+              </a:rPr>
+              <a:t>Confirm the data imported correctly by using the “</a:t>
+            </a:r>
+            <a:r>
+              <a:rPr lang="en-US" sz="1400" b="0" i="0" dirty="0" err="1">
+                <a:solidFill>
+                  <a:srgbClr val="24292E"/>
+                </a:solidFill>
+                <a:effectLst/>
+              </a:rPr>
+              <a:t>pd.read_sql_table</a:t>
+            </a:r>
+            <a:r>
+              <a:rPr lang="en-US" sz="1400" b="0" i="0" dirty="0">
+                <a:solidFill>
+                  <a:srgbClr val="24292E"/>
+                </a:solidFill>
+                <a:effectLst/>
+              </a:rPr>
+              <a:t>” pandas command. If the import was successful, this will display the designated table in our </a:t>
+            </a:r>
+            <a:r>
+              <a:rPr lang="en-US" sz="1400" b="0" i="0" dirty="0" err="1">
+                <a:solidFill>
+                  <a:srgbClr val="24292E"/>
+                </a:solidFill>
+                <a:effectLst/>
+              </a:rPr>
+              <a:t>Jupyter</a:t>
+            </a:r>
+            <a:r>
+              <a:rPr lang="en-US" sz="1400" b="0" i="0" dirty="0">
+                <a:solidFill>
+                  <a:srgbClr val="24292E"/>
+                </a:solidFill>
+                <a:effectLst/>
+              </a:rPr>
+              <a:t> notebook as a data frame.</a:t>
+            </a:r>
+          </a:p>
+          <a:p>
+            <a:pPr marL="0" lvl="0" indent="0" algn="l" rtl="0">
+              <a:spcBef>
+                <a:spcPts val="0"/>
+              </a:spcBef>
+              <a:spcAft>
+                <a:spcPts val="0"/>
+              </a:spcAft>
+              <a:buNone/>
+            </a:pPr>
+            <a:endParaRPr lang="en-US" sz="2000" dirty="0"/>
+          </a:p>
+        </p:txBody>
+      </p:sp>
+    </p:spTree>
+    <p:extLst>
+      <p:ext uri="{BB962C8B-B14F-4D97-AF65-F5344CB8AC3E}">
+        <p14:creationId xmlns:p14="http://schemas.microsoft.com/office/powerpoint/2010/main" val="757917783"/>
+      </p:ext>
+    </p:extLst>
+  </p:cSld>
+  <p:clrMapOvr>
+    <a:masterClrMapping/>
+  </p:clrMapOvr>
+</p:sld>
+</file>
+
+<file path=ppt/slides/slide6.xml><?xml version="1.0" encoding="utf-8"?>
+<p:sld xmlns:a="http://schemas.openxmlformats.org/drawingml/2006/main" xmlns:r="http://schemas.openxmlformats.org/officeDocument/2006/relationships" xmlns:p="http://schemas.openxmlformats.org/presentationml/2006/main">
+  <p:cSld>
+    <p:bg>
+      <p:bgPr>
+        <a:blipFill dpi="0" rotWithShape="0">
+          <a:blip r:embed="rId2" cstate="print"/>
+          <a:srcRect/>
+          <a:stretch>
+            <a:fillRect/>
+          </a:stretch>
+        </a:blipFill>
+        <a:effectLst/>
+      </p:bgPr>
+    </p:bg>
+    <p:spTree>
+      <p:nvGrpSpPr>
+        <p:cNvPr id="1" name=""/>
+        <p:cNvGrpSpPr/>
+        <p:nvPr/>
+      </p:nvGrpSpPr>
+      <p:grpSpPr>
+        <a:xfrm>
+          <a:off x="0" y="0"/>
+          <a:ext cx="0" cy="0"/>
+          <a:chOff x="0" y="0"/>
+          <a:chExt cx="0" cy="0"/>
+        </a:xfrm>
+      </p:grpSpPr>
+      <p:sp>
+        <p:nvSpPr>
+          <p:cNvPr id="114690" name="Rectangle 2"/>
+          <p:cNvSpPr>
+            <a:spLocks noGrp="1" noChangeArrowheads="1"/>
+          </p:cNvSpPr>
+          <p:nvPr>
+            <p:ph type="title"/>
+          </p:nvPr>
+        </p:nvSpPr>
+        <p:spPr>
+          <a:xfrm>
+            <a:off x="1908175" y="188913"/>
+            <a:ext cx="6553200" cy="723900"/>
+          </a:xfrm>
+        </p:spPr>
+        <p:txBody>
+          <a:bodyPr/>
+          <a:lstStyle/>
+          <a:p>
+            <a:pPr eaLnBrk="1" hangingPunct="1">
+              <a:defRPr/>
+            </a:pPr>
+            <a:r>
+              <a:rPr lang="en" dirty="0"/>
+              <a:t>Machine Learning Model</a:t>
+            </a:r>
+            <a:endParaRPr lang="en-US" dirty="0">
+              <a:solidFill>
+                <a:schemeClr val="tx1">
+                  <a:lumMod val="95000"/>
+                  <a:lumOff val="5000"/>
+                </a:schemeClr>
+              </a:solidFill>
+            </a:endParaRPr>
+          </a:p>
+        </p:txBody>
+      </p:sp>
+      <p:sp>
+        <p:nvSpPr>
+          <p:cNvPr id="114691" name="Rectangle 3"/>
+          <p:cNvSpPr>
+            <a:spLocks noGrp="1" noChangeArrowheads="1"/>
+          </p:cNvSpPr>
+          <p:nvPr>
+            <p:ph type="body" idx="1"/>
+          </p:nvPr>
+        </p:nvSpPr>
+        <p:spPr>
+          <a:xfrm>
+            <a:off x="1908175" y="1052513"/>
+            <a:ext cx="6911975" cy="5473700"/>
+          </a:xfrm>
+        </p:spPr>
+        <p:txBody>
+          <a:bodyPr/>
+          <a:lstStyle/>
+          <a:p>
             <a:pPr marL="0" indent="0">
               <a:spcBef>
                 <a:spcPts val="0"/>
@@ -3710,7 +4710,6 @@
                   <a:srgbClr val="24292E"/>
                 </a:solidFill>
                 <a:effectLst/>
-                <a:latin typeface="-apple-system"/>
               </a:rPr>
               <a:t>Through pre-processing the data, we chose supervised learning via a Random Forest Model.</a:t>
             </a:r>
@@ -3729,7 +4728,6 @@
               <a:solidFill>
                 <a:srgbClr val="24292E"/>
               </a:solidFill>
-              <a:latin typeface="-apple-system"/>
             </a:endParaRPr>
           </a:p>
           <a:p>
@@ -3748,7 +4746,6 @@
                   <a:srgbClr val="24292E"/>
                 </a:solidFill>
                 <a:effectLst/>
-                <a:latin typeface="-apple-system"/>
               </a:rPr>
               <a:t>The Random Forest Model uses classification to predict based on our salary target and our features which are year, team, stats (like strikeouts), and birth year. By pairing down the data, through combining and cleaning the csv files, it really dialed in to the details of what we wanted to measure. </a:t>
             </a:r>
@@ -3767,7 +4764,6 @@
               <a:solidFill>
                 <a:srgbClr val="24292E"/>
               </a:solidFill>
-              <a:latin typeface="-apple-system"/>
             </a:endParaRPr>
           </a:p>
           <a:p>
@@ -3786,7 +4782,6 @@
                   <a:srgbClr val="24292E"/>
                 </a:solidFill>
                 <a:effectLst/>
-                <a:latin typeface="-apple-system"/>
               </a:rPr>
               <a:t>Basing the main measures on Mike Trout's core statistics(SO,AB,R,H,HR,G,R and RBIs), we used his metrics as a baseline to look for when deciding our final goal. Also, including the ‘</a:t>
             </a:r>
@@ -3796,7 +4791,6 @@
                   <a:srgbClr val="24292E"/>
                 </a:solidFill>
                 <a:effectLst/>
-                <a:latin typeface="-apple-system"/>
               </a:rPr>
               <a:t>awardID</a:t>
             </a:r>
@@ -3806,7 +4800,6 @@
                   <a:srgbClr val="24292E"/>
                 </a:solidFill>
                 <a:effectLst/>
-                <a:latin typeface="-apple-system"/>
               </a:rPr>
               <a:t>’, which shows which award each player won, and ‘</a:t>
             </a:r>
@@ -3816,7 +4809,6 @@
                   <a:srgbClr val="24292E"/>
                 </a:solidFill>
                 <a:effectLst/>
-                <a:latin typeface="-apple-system"/>
               </a:rPr>
               <a:t>lgID</a:t>
             </a:r>
@@ -3826,7 +4818,6 @@
                   <a:srgbClr val="24292E"/>
                 </a:solidFill>
                 <a:effectLst/>
-                <a:latin typeface="-apple-system"/>
               </a:rPr>
               <a:t>’, which shows the league in to see if that had any impact. </a:t>
             </a:r>
@@ -3845,7 +4836,6 @@
               <a:solidFill>
                 <a:srgbClr val="24292E"/>
               </a:solidFill>
-              <a:latin typeface="-apple-system"/>
             </a:endParaRPr>
           </a:p>
           <a:p>
@@ -3864,7 +4854,6 @@
                   <a:srgbClr val="24292E"/>
                 </a:solidFill>
                 <a:effectLst/>
-                <a:latin typeface="-apple-system"/>
               </a:rPr>
               <a:t>Then the Random Forest Model interprets this information and gives an accuracy score based on what is the most impactful in deciding the salary of a player. The confusion matrix and list of </a:t>
             </a:r>
@@ -3874,7 +4863,6 @@
                   <a:srgbClr val="24292E"/>
                 </a:solidFill>
                 <a:effectLst/>
-                <a:latin typeface="-apple-system"/>
               </a:rPr>
               <a:t>importances</a:t>
             </a:r>
@@ -3884,7 +4872,6 @@
                   <a:srgbClr val="24292E"/>
                 </a:solidFill>
                 <a:effectLst/>
-                <a:latin typeface="-apple-system"/>
               </a:rPr>
               <a:t> each show the logic behind what determines how much to pay each player.</a:t>
             </a:r>
@@ -3932,7 +4919,7 @@
         </p:blipFill>
         <p:spPr>
           <a:xfrm>
-            <a:off x="3200400" y="4559300"/>
+            <a:off x="5508624" y="4606586"/>
             <a:ext cx="2952751" cy="1966913"/>
           </a:xfrm>
           <a:prstGeom prst="rect">
@@ -3954,7 +4941,7 @@
         </p:nvSpPr>
         <p:spPr>
           <a:xfrm>
-            <a:off x="6302376" y="6032054"/>
+            <a:off x="3087687" y="6057226"/>
             <a:ext cx="2286000" cy="430887"/>
           </a:xfrm>
           <a:prstGeom prst="rect">
@@ -3988,7 +4975,576 @@
 </p:sld>
 </file>
 
-<file path=ppt/slides/slide6.xml><?xml version="1.0" encoding="utf-8"?>
+<file path=ppt/slides/slide7.xml><?xml version="1.0" encoding="utf-8"?>
+<p:sld xmlns:a="http://schemas.openxmlformats.org/drawingml/2006/main" xmlns:r="http://schemas.openxmlformats.org/officeDocument/2006/relationships" xmlns:p="http://schemas.openxmlformats.org/presentationml/2006/main">
+  <p:cSld>
+    <p:bg>
+      <p:bgPr>
+        <a:blipFill dpi="0" rotWithShape="0">
+          <a:blip r:embed="rId2" cstate="print"/>
+          <a:srcRect/>
+          <a:stretch>
+            <a:fillRect/>
+          </a:stretch>
+        </a:blipFill>
+        <a:effectLst/>
+      </p:bgPr>
+    </p:bg>
+    <p:spTree>
+      <p:nvGrpSpPr>
+        <p:cNvPr id="1" name=""/>
+        <p:cNvGrpSpPr/>
+        <p:nvPr/>
+      </p:nvGrpSpPr>
+      <p:grpSpPr>
+        <a:xfrm>
+          <a:off x="0" y="0"/>
+          <a:ext cx="0" cy="0"/>
+          <a:chOff x="0" y="0"/>
+          <a:chExt cx="0" cy="0"/>
+        </a:xfrm>
+      </p:grpSpPr>
+      <p:sp>
+        <p:nvSpPr>
+          <p:cNvPr id="114690" name="Rectangle 2"/>
+          <p:cNvSpPr>
+            <a:spLocks noGrp="1" noChangeArrowheads="1"/>
+          </p:cNvSpPr>
+          <p:nvPr>
+            <p:ph type="title"/>
+          </p:nvPr>
+        </p:nvSpPr>
+        <p:spPr>
+          <a:xfrm>
+            <a:off x="1908175" y="188913"/>
+            <a:ext cx="6553200" cy="723900"/>
+          </a:xfrm>
+        </p:spPr>
+        <p:txBody>
+          <a:bodyPr/>
+          <a:lstStyle/>
+          <a:p>
+            <a:pPr eaLnBrk="1" hangingPunct="1">
+              <a:defRPr/>
+            </a:pPr>
+            <a:r>
+              <a:rPr lang="en" dirty="0"/>
+              <a:t>Asking Questions</a:t>
+            </a:r>
+            <a:endParaRPr lang="en-US" dirty="0">
+              <a:solidFill>
+                <a:schemeClr val="tx1">
+                  <a:lumMod val="95000"/>
+                  <a:lumOff val="5000"/>
+                </a:schemeClr>
+              </a:solidFill>
+            </a:endParaRPr>
+          </a:p>
+        </p:txBody>
+      </p:sp>
+      <p:sp>
+        <p:nvSpPr>
+          <p:cNvPr id="114691" name="Rectangle 3"/>
+          <p:cNvSpPr>
+            <a:spLocks noGrp="1" noChangeArrowheads="1"/>
+          </p:cNvSpPr>
+          <p:nvPr>
+            <p:ph type="body" idx="1"/>
+          </p:nvPr>
+        </p:nvSpPr>
+        <p:spPr>
+          <a:xfrm>
+            <a:off x="1908175" y="1052513"/>
+            <a:ext cx="6911975" cy="5473700"/>
+          </a:xfrm>
+        </p:spPr>
+        <p:txBody>
+          <a:bodyPr/>
+          <a:lstStyle/>
+          <a:p>
+            <a:pPr marL="0" indent="0">
+              <a:spcBef>
+                <a:spcPts val="0"/>
+              </a:spcBef>
+              <a:spcAft>
+                <a:spcPts val="0"/>
+              </a:spcAft>
+              <a:buNone/>
+            </a:pPr>
+            <a:endParaRPr lang="en-US" sz="1400" b="0" i="0" dirty="0">
+              <a:solidFill>
+                <a:srgbClr val="24292E"/>
+              </a:solidFill>
+              <a:effectLst/>
+            </a:endParaRPr>
+          </a:p>
+          <a:p>
+            <a:pPr marL="0" indent="0">
+              <a:spcBef>
+                <a:spcPts val="0"/>
+              </a:spcBef>
+              <a:spcAft>
+                <a:spcPts val="0"/>
+              </a:spcAft>
+              <a:buNone/>
+            </a:pPr>
+            <a:endParaRPr lang="en-US" sz="1400" dirty="0">
+              <a:solidFill>
+                <a:srgbClr val="24292E"/>
+              </a:solidFill>
+            </a:endParaRPr>
+          </a:p>
+          <a:p>
+            <a:pPr marL="0" indent="0">
+              <a:spcBef>
+                <a:spcPts val="0"/>
+              </a:spcBef>
+              <a:spcAft>
+                <a:spcPts val="0"/>
+              </a:spcAft>
+              <a:buNone/>
+            </a:pPr>
+            <a:endParaRPr lang="en-US" sz="1400" b="0" i="0" dirty="0">
+              <a:solidFill>
+                <a:srgbClr val="24292E"/>
+              </a:solidFill>
+              <a:effectLst/>
+            </a:endParaRPr>
+          </a:p>
+          <a:p>
+            <a:pPr marL="0" indent="0">
+              <a:spcBef>
+                <a:spcPts val="0"/>
+              </a:spcBef>
+              <a:spcAft>
+                <a:spcPts val="0"/>
+              </a:spcAft>
+              <a:buNone/>
+            </a:pPr>
+            <a:r>
+              <a:rPr lang="en-US" sz="1400" b="0" i="0" dirty="0">
+                <a:solidFill>
+                  <a:srgbClr val="24292E"/>
+                </a:solidFill>
+                <a:effectLst/>
+              </a:rPr>
+              <a:t>Now that we have our model – what questions should we ask of it?  </a:t>
+            </a:r>
+          </a:p>
+          <a:p>
+            <a:pPr marL="0" indent="0">
+              <a:spcBef>
+                <a:spcPts val="0"/>
+              </a:spcBef>
+              <a:spcAft>
+                <a:spcPts val="0"/>
+              </a:spcAft>
+              <a:buNone/>
+            </a:pPr>
+            <a:endParaRPr lang="en-US" sz="1400" dirty="0">
+              <a:solidFill>
+                <a:srgbClr val="24292E"/>
+              </a:solidFill>
+            </a:endParaRPr>
+          </a:p>
+          <a:p>
+            <a:pPr marL="0" indent="0">
+              <a:spcBef>
+                <a:spcPts val="0"/>
+              </a:spcBef>
+              <a:spcAft>
+                <a:spcPts val="0"/>
+              </a:spcAft>
+              <a:buNone/>
+            </a:pPr>
+            <a:endParaRPr lang="en-US" sz="1400" dirty="0"/>
+          </a:p>
+          <a:p>
+            <a:pPr marL="0" indent="0">
+              <a:spcBef>
+                <a:spcPts val="0"/>
+              </a:spcBef>
+              <a:spcAft>
+                <a:spcPts val="0"/>
+              </a:spcAft>
+              <a:buNone/>
+            </a:pPr>
+            <a:r>
+              <a:rPr lang="en-US" sz="1400" dirty="0"/>
+              <a:t>Our initial approach is to examine the impact of salary on the success of a team.  </a:t>
+            </a:r>
+          </a:p>
+          <a:p>
+            <a:pPr marL="0" indent="0">
+              <a:spcBef>
+                <a:spcPts val="0"/>
+              </a:spcBef>
+              <a:spcAft>
+                <a:spcPts val="0"/>
+              </a:spcAft>
+              <a:buNone/>
+            </a:pPr>
+            <a:endParaRPr lang="en-US" sz="1400" dirty="0"/>
+          </a:p>
+          <a:p>
+            <a:pPr marL="0" indent="0">
+              <a:spcBef>
+                <a:spcPts val="0"/>
+              </a:spcBef>
+              <a:spcAft>
+                <a:spcPts val="0"/>
+              </a:spcAft>
+              <a:buNone/>
+            </a:pPr>
+            <a:endParaRPr lang="en-US" sz="1400" dirty="0"/>
+          </a:p>
+          <a:p>
+            <a:pPr marL="0" indent="0">
+              <a:spcBef>
+                <a:spcPts val="0"/>
+              </a:spcBef>
+              <a:spcAft>
+                <a:spcPts val="0"/>
+              </a:spcAft>
+              <a:buNone/>
+            </a:pPr>
+            <a:r>
+              <a:rPr lang="en-US" sz="1400" dirty="0"/>
+              <a:t>Baseball’s biggest teams – from the New York Yankees to the 2020 World Champion Los Angeles Dodgers – spend big bucks to field teams with famous names and Hall of Fame potential.  But does this always result in success?</a:t>
+            </a:r>
+          </a:p>
+          <a:p>
+            <a:pPr marL="0" indent="0">
+              <a:spcBef>
+                <a:spcPts val="0"/>
+              </a:spcBef>
+              <a:spcAft>
+                <a:spcPts val="0"/>
+              </a:spcAft>
+              <a:buNone/>
+            </a:pPr>
+            <a:endParaRPr lang="en-US" sz="1400" dirty="0"/>
+          </a:p>
+          <a:p>
+            <a:pPr marL="0" indent="0">
+              <a:spcBef>
+                <a:spcPts val="0"/>
+              </a:spcBef>
+              <a:spcAft>
+                <a:spcPts val="0"/>
+              </a:spcAft>
+              <a:buNone/>
+            </a:pPr>
+            <a:endParaRPr lang="en-US" sz="1400" dirty="0"/>
+          </a:p>
+          <a:p>
+            <a:pPr marL="0" indent="0">
+              <a:spcBef>
+                <a:spcPts val="0"/>
+              </a:spcBef>
+              <a:spcAft>
+                <a:spcPts val="0"/>
+              </a:spcAft>
+              <a:buNone/>
+            </a:pPr>
+            <a:r>
+              <a:rPr lang="en-US" sz="1400" dirty="0"/>
+              <a:t>Speaking of salary – what statistics do the players with the highest salaries have in common?  Which statistic is the most significant indicator of how much a player should earn, based on historical data?</a:t>
+            </a:r>
+          </a:p>
+          <a:p>
+            <a:pPr marL="0" indent="0">
+              <a:spcBef>
+                <a:spcPts val="0"/>
+              </a:spcBef>
+              <a:spcAft>
+                <a:spcPts val="0"/>
+              </a:spcAft>
+              <a:buNone/>
+            </a:pPr>
+            <a:endParaRPr lang="en-US" sz="1400" dirty="0"/>
+          </a:p>
+          <a:p>
+            <a:pPr marL="0" indent="0">
+              <a:spcBef>
+                <a:spcPts val="0"/>
+              </a:spcBef>
+              <a:spcAft>
+                <a:spcPts val="0"/>
+              </a:spcAft>
+              <a:buNone/>
+            </a:pPr>
+            <a:endParaRPr lang="en-US" sz="1400" dirty="0"/>
+          </a:p>
+          <a:p>
+            <a:pPr marL="0" indent="0">
+              <a:spcBef>
+                <a:spcPts val="0"/>
+              </a:spcBef>
+              <a:spcAft>
+                <a:spcPts val="0"/>
+              </a:spcAft>
+              <a:buNone/>
+            </a:pPr>
+            <a:r>
+              <a:rPr lang="en-US" sz="1400" dirty="0"/>
+              <a:t>Can we predict if a team should win the world series, based on certain statistics?  And what statistics should they be?  </a:t>
+            </a:r>
+          </a:p>
+          <a:p>
+            <a:pPr marL="0" indent="0">
+              <a:spcBef>
+                <a:spcPts val="0"/>
+              </a:spcBef>
+              <a:spcAft>
+                <a:spcPts val="0"/>
+              </a:spcAft>
+              <a:buNone/>
+            </a:pPr>
+            <a:endParaRPr lang="en-US" sz="1400" dirty="0"/>
+          </a:p>
+          <a:p>
+            <a:pPr marL="0" indent="0">
+              <a:spcBef>
+                <a:spcPts val="0"/>
+              </a:spcBef>
+              <a:spcAft>
+                <a:spcPts val="0"/>
+              </a:spcAft>
+              <a:buNone/>
+            </a:pPr>
+            <a:endParaRPr lang="en-US" sz="1400" dirty="0"/>
+          </a:p>
+          <a:p>
+            <a:pPr marL="0" lvl="0" indent="0" algn="l" rtl="0">
+              <a:spcBef>
+                <a:spcPts val="0"/>
+              </a:spcBef>
+              <a:spcAft>
+                <a:spcPts val="0"/>
+              </a:spcAft>
+              <a:buNone/>
+            </a:pPr>
+            <a:endParaRPr lang="en-US" sz="2000" dirty="0"/>
+          </a:p>
+        </p:txBody>
+      </p:sp>
+    </p:spTree>
+    <p:extLst>
+      <p:ext uri="{BB962C8B-B14F-4D97-AF65-F5344CB8AC3E}">
+        <p14:creationId xmlns:p14="http://schemas.microsoft.com/office/powerpoint/2010/main" val="3183832843"/>
+      </p:ext>
+    </p:extLst>
+  </p:cSld>
+  <p:clrMapOvr>
+    <a:masterClrMapping/>
+  </p:clrMapOvr>
+</p:sld>
+</file>
+
+<file path=ppt/slides/slide8.xml><?xml version="1.0" encoding="utf-8"?>
+<p:sld xmlns:a="http://schemas.openxmlformats.org/drawingml/2006/main" xmlns:r="http://schemas.openxmlformats.org/officeDocument/2006/relationships" xmlns:p="http://schemas.openxmlformats.org/presentationml/2006/main">
+  <p:cSld>
+    <p:spTree>
+      <p:nvGrpSpPr>
+        <p:cNvPr id="1" name=""/>
+        <p:cNvGrpSpPr/>
+        <p:nvPr/>
+      </p:nvGrpSpPr>
+      <p:grpSpPr>
+        <a:xfrm>
+          <a:off x="0" y="0"/>
+          <a:ext cx="0" cy="0"/>
+          <a:chOff x="0" y="0"/>
+          <a:chExt cx="0" cy="0"/>
+        </a:xfrm>
+      </p:grpSpPr>
+      <p:sp>
+        <p:nvSpPr>
+          <p:cNvPr id="4098" name="Rectangle 2"/>
+          <p:cNvSpPr>
+            <a:spLocks noGrp="1" noChangeArrowheads="1"/>
+          </p:cNvSpPr>
+          <p:nvPr>
+            <p:ph type="title"/>
+          </p:nvPr>
+        </p:nvSpPr>
+        <p:spPr>
+          <a:xfrm>
+            <a:off x="2143125" y="1714500"/>
+            <a:ext cx="6480175" cy="649288"/>
+          </a:xfrm>
+        </p:spPr>
+        <p:txBody>
+          <a:bodyPr/>
+          <a:lstStyle/>
+          <a:p>
+            <a:pPr algn="r" eaLnBrk="1" hangingPunct="1"/>
+            <a:r>
+              <a:rPr lang="en" sz="2400" dirty="0">
+                <a:solidFill>
+                  <a:schemeClr val="accent2"/>
+                </a:solidFill>
+              </a:rPr>
+              <a:t>Asking Questions</a:t>
+            </a:r>
+            <a:endParaRPr lang="uk-UA" sz="3200" dirty="0">
+              <a:solidFill>
+                <a:schemeClr val="accent2"/>
+              </a:solidFill>
+            </a:endParaRPr>
+          </a:p>
+        </p:txBody>
+      </p:sp>
+      <p:sp>
+        <p:nvSpPr>
+          <p:cNvPr id="5" name="TextBox 4">
+            <a:extLst>
+              <a:ext uri="{FF2B5EF4-FFF2-40B4-BE49-F238E27FC236}">
+                <a16:creationId xmlns:a16="http://schemas.microsoft.com/office/drawing/2014/main" id="{27FDFBF3-BDE4-42DA-89EF-652788DF2A14}"/>
+              </a:ext>
+            </a:extLst>
+          </p:cNvPr>
+          <p:cNvSpPr txBox="1"/>
+          <p:nvPr/>
+        </p:nvSpPr>
+        <p:spPr>
+          <a:xfrm>
+            <a:off x="228600" y="2970907"/>
+            <a:ext cx="4600028" cy="3231654"/>
+          </a:xfrm>
+          <a:prstGeom prst="rect">
+            <a:avLst/>
+          </a:prstGeom>
+          <a:noFill/>
+        </p:spPr>
+        <p:txBody>
+          <a:bodyPr wrap="square" rtlCol="0">
+            <a:spAutoFit/>
+          </a:bodyPr>
+          <a:lstStyle/>
+          <a:p>
+            <a:r>
+              <a:rPr lang="en-US" sz="1200" b="1" dirty="0"/>
+              <a:t>Does Team Salary equal Team Success?</a:t>
+            </a:r>
+          </a:p>
+          <a:p>
+            <a:endParaRPr lang="en-US" sz="1200" dirty="0"/>
+          </a:p>
+          <a:p>
+            <a:r>
+              <a:rPr lang="en-US" sz="1200" dirty="0"/>
+              <a:t>Let’s look at regular season wins from 1985 to 2016.  </a:t>
+            </a:r>
+          </a:p>
+          <a:p>
+            <a:endParaRPr lang="en-US" sz="1200" dirty="0"/>
+          </a:p>
+          <a:p>
+            <a:r>
+              <a:rPr lang="en-US" sz="1200" dirty="0"/>
+              <a:t>On this scatter plot, we can see a positive correlation between the money spent and the amount of wins a team gets.  </a:t>
+            </a:r>
+          </a:p>
+          <a:p>
+            <a:endParaRPr lang="en-US" sz="1200" dirty="0"/>
+          </a:p>
+          <a:p>
+            <a:r>
+              <a:rPr lang="en-US" sz="1200" dirty="0"/>
+              <a:t>However, it’s not a very strong correlation – the R value is only .25</a:t>
+            </a:r>
+          </a:p>
+          <a:p>
+            <a:endParaRPr lang="en-US" sz="1200" dirty="0"/>
+          </a:p>
+          <a:p>
+            <a:r>
+              <a:rPr lang="en-US" sz="1200" dirty="0"/>
+              <a:t>The P-value is also extremely high – over 5.0 – meaning that the relationship doesn’t seem to have an impact on the result.  </a:t>
+            </a:r>
+          </a:p>
+          <a:p>
+            <a:endParaRPr lang="en-US" sz="1200" dirty="0"/>
+          </a:p>
+          <a:p>
+            <a:r>
+              <a:rPr lang="en-US" sz="1200" dirty="0"/>
+              <a:t>This could be due to various factors, including the ballooning of salaries in the 21</a:t>
+            </a:r>
+            <a:r>
+              <a:rPr lang="en-US" sz="1200" baseline="30000" dirty="0"/>
+              <a:t>st</a:t>
+            </a:r>
+            <a:r>
+              <a:rPr lang="en-US" sz="1200" dirty="0"/>
+              <a:t> century.  But one thing’s clear, your overall team expenditure doesn’t always equal success, especially in the regular season.  </a:t>
+            </a:r>
+          </a:p>
+        </p:txBody>
+      </p:sp>
+      <p:pic>
+        <p:nvPicPr>
+          <p:cNvPr id="1026" name="Picture 2">
+            <a:extLst>
+              <a:ext uri="{FF2B5EF4-FFF2-40B4-BE49-F238E27FC236}">
+                <a16:creationId xmlns:a16="http://schemas.microsoft.com/office/drawing/2014/main" id="{A14FFD17-C31F-484D-8664-997C28C2DDE3}"/>
+              </a:ext>
+            </a:extLst>
+          </p:cNvPr>
+          <p:cNvPicPr>
+            <a:picLocks noChangeAspect="1" noChangeArrowheads="1"/>
+          </p:cNvPicPr>
+          <p:nvPr/>
+        </p:nvPicPr>
+        <p:blipFill>
+          <a:blip r:embed="rId3">
+            <a:extLst>
+              <a:ext uri="{28A0092B-C50C-407E-A947-70E740481C1C}">
+                <a14:useLocalDpi xmlns:a14="http://schemas.microsoft.com/office/drawing/2010/main" val="0"/>
+              </a:ext>
+            </a:extLst>
+          </a:blip>
+          <a:srcRect/>
+          <a:stretch>
+            <a:fillRect/>
+          </a:stretch>
+        </p:blipFill>
+        <p:spPr bwMode="auto">
+          <a:xfrm>
+            <a:off x="5181600" y="2970907"/>
+            <a:ext cx="3543300" cy="2466975"/>
+          </a:xfrm>
+          <a:prstGeom prst="rect">
+            <a:avLst/>
+          </a:prstGeom>
+          <a:noFill/>
+          <a:extLst>
+            <a:ext uri="{909E8E84-426E-40DD-AFC4-6F175D3DCCD1}">
+              <a14:hiddenFill xmlns:a14="http://schemas.microsoft.com/office/drawing/2010/main">
+                <a:solidFill>
+                  <a:srgbClr val="FFFFFF"/>
+                </a:solidFill>
+              </a14:hiddenFill>
+            </a:ext>
+          </a:extLst>
+        </p:spPr>
+      </p:pic>
+    </p:spTree>
+    <p:extLst>
+      <p:ext uri="{BB962C8B-B14F-4D97-AF65-F5344CB8AC3E}">
+        <p14:creationId xmlns:p14="http://schemas.microsoft.com/office/powerpoint/2010/main" val="1743503932"/>
+      </p:ext>
+    </p:extLst>
+  </p:cSld>
+  <p:clrMapOvr>
+    <a:masterClrMapping/>
+  </p:clrMapOvr>
+</p:sld>
+</file>
+
+<file path=ppt/slides/slide9.xml><?xml version="1.0" encoding="utf-8"?>
 <p:sld xmlns:a="http://schemas.openxmlformats.org/drawingml/2006/main" xmlns:r="http://schemas.openxmlformats.org/officeDocument/2006/relationships" xmlns:p="http://schemas.openxmlformats.org/presentationml/2006/main">
   <p:cSld>
     <p:spTree>
@@ -4064,7 +5620,7 @@
         </p:blipFill>
         <p:spPr>
           <a:xfrm>
-            <a:off x="4688926" y="2971800"/>
+            <a:off x="4990551" y="2647207"/>
             <a:ext cx="3934374" cy="3391373"/>
           </a:xfrm>
           <a:prstGeom prst="rect">
@@ -4074,10 +5630,10 @@
       </p:pic>
       <p:sp>
         <p:nvSpPr>
-          <p:cNvPr id="4" name="TextBox 3">
+          <p:cNvPr id="5" name="TextBox 4">
             <a:extLst>
               <a:ext uri="{FF2B5EF4-FFF2-40B4-BE49-F238E27FC236}">
-                <a16:creationId xmlns:a16="http://schemas.microsoft.com/office/drawing/2014/main" id="{129137F0-217C-400B-B5D8-7EA6493D90B5}"/>
+                <a16:creationId xmlns:a16="http://schemas.microsoft.com/office/drawing/2014/main" id="{27FDFBF3-BDE4-42DA-89EF-652788DF2A14}"/>
               </a:ext>
             </a:extLst>
           </p:cNvPr>
@@ -4086,8 +5642,8 @@
         </p:nvSpPr>
         <p:spPr>
           <a:xfrm>
-            <a:off x="304800" y="2946622"/>
-            <a:ext cx="3934374" cy="2123658"/>
+            <a:off x="228600" y="2819400"/>
+            <a:ext cx="4600028" cy="3046988"/>
           </a:xfrm>
           <a:prstGeom prst="rect">
             <a:avLst/>
@@ -4101,128 +5657,71 @@
           <a:lstStyle/>
           <a:p>
             <a:r>
+              <a:rPr lang="en-US" sz="1200" b="1" dirty="0"/>
+              <a:t>Based on historical data, what statistic is the most important indicator of a player’s earnings? </a:t>
+            </a:r>
+          </a:p>
+          <a:p>
+            <a:endParaRPr lang="en-US" sz="1200" dirty="0"/>
+          </a:p>
+          <a:p>
+            <a:r>
               <a:rPr lang="en-US" sz="1200" dirty="0"/>
-              <a:t>Baseball has more stats than you can count, but our dataset provides significant data for:</a:t>
+              <a:t>The feature set we have chosen for this model includes:</a:t>
             </a:r>
           </a:p>
           <a:p>
             <a:endParaRPr lang="en-US" sz="1200" dirty="0"/>
           </a:p>
           <a:p>
-            <a:pPr marL="285750" indent="-285750">
-              <a:buFont typeface="Arial" panose="020B0604020202020204" pitchFamily="34" charset="0"/>
-              <a:buChar char="•"/>
-            </a:pPr>
             <a:r>
               <a:rPr lang="en-US" sz="1200" dirty="0"/>
-              <a:t>Strike-Outs (SO)</a:t>
-            </a:r>
-          </a:p>
-          <a:p>
-            <a:pPr marL="285750" indent="-285750">
-              <a:buFont typeface="Arial" panose="020B0604020202020204" pitchFamily="34" charset="0"/>
-              <a:buChar char="•"/>
-            </a:pPr>
+              <a:t>SO: Strike-Outs</a:t>
+            </a:r>
+          </a:p>
+          <a:p>
             <a:r>
               <a:rPr lang="en-US" sz="1200" dirty="0"/>
-              <a:t>At-Bats (AB)</a:t>
-            </a:r>
-          </a:p>
-          <a:p>
-            <a:pPr marL="285750" indent="-285750">
-              <a:buFont typeface="Arial" panose="020B0604020202020204" pitchFamily="34" charset="0"/>
-              <a:buChar char="•"/>
-            </a:pPr>
+              <a:t>AB: At-Bats</a:t>
+            </a:r>
+          </a:p>
+          <a:p>
             <a:r>
               <a:rPr lang="en-US" sz="1200" dirty="0"/>
-              <a:t>Games Played (G)</a:t>
-            </a:r>
-          </a:p>
-          <a:p>
-            <a:pPr marL="285750" indent="-285750">
-              <a:buFont typeface="Arial" panose="020B0604020202020204" pitchFamily="34" charset="0"/>
-              <a:buChar char="•"/>
-            </a:pPr>
+              <a:t>G: Games Played</a:t>
+            </a:r>
+          </a:p>
+          <a:p>
             <a:r>
               <a:rPr lang="en-US" sz="1200" dirty="0"/>
-              <a:t>Hits (H)</a:t>
-            </a:r>
-          </a:p>
-          <a:p>
-            <a:pPr marL="285750" indent="-285750">
-              <a:buFont typeface="Arial" panose="020B0604020202020204" pitchFamily="34" charset="0"/>
-              <a:buChar char="•"/>
-            </a:pPr>
+              <a:t>RBI: Runs Batted-In</a:t>
+            </a:r>
+          </a:p>
+          <a:p>
             <a:r>
               <a:rPr lang="en-US" sz="1200" dirty="0"/>
-              <a:t>Home Runs (HR)</a:t>
-            </a:r>
-          </a:p>
-          <a:p>
-            <a:pPr marL="285750" indent="-285750">
-              <a:buFont typeface="Arial" panose="020B0604020202020204" pitchFamily="34" charset="0"/>
-              <a:buChar char="•"/>
-            </a:pPr>
+              <a:t>R: Runs Scored</a:t>
+            </a:r>
+          </a:p>
+          <a:p>
             <a:r>
               <a:rPr lang="en-US" sz="1200" dirty="0"/>
-              <a:t>Runs Scored (R)</a:t>
-            </a:r>
-          </a:p>
-          <a:p>
-            <a:pPr marL="285750" indent="-285750">
-              <a:buFont typeface="Arial" panose="020B0604020202020204" pitchFamily="34" charset="0"/>
-              <a:buChar char="•"/>
-            </a:pPr>
+              <a:t>HR: Home Runs</a:t>
+            </a:r>
+          </a:p>
+          <a:p>
             <a:r>
               <a:rPr lang="en-US" sz="1200" dirty="0"/>
-              <a:t>Runs Batted-In (RBI)</a:t>
+              <a:t>H: Total Hits</a:t>
             </a:r>
           </a:p>
           <a:p>
             <a:endParaRPr lang="en-US" sz="1200" dirty="0"/>
           </a:p>
-        </p:txBody>
-      </p:sp>
-      <p:sp>
-        <p:nvSpPr>
-          <p:cNvPr id="5" name="TextBox 4">
-            <a:extLst>
-              <a:ext uri="{FF2B5EF4-FFF2-40B4-BE49-F238E27FC236}">
-                <a16:creationId xmlns:a16="http://schemas.microsoft.com/office/drawing/2014/main" id="{27FDFBF3-BDE4-42DA-89EF-652788DF2A14}"/>
-              </a:ext>
-            </a:extLst>
-          </p:cNvPr>
-          <p:cNvSpPr txBox="1"/>
-          <p:nvPr/>
-        </p:nvSpPr>
-        <p:spPr>
-          <a:xfrm>
-            <a:off x="304800" y="4953000"/>
-            <a:ext cx="4447628" cy="1384995"/>
-          </a:xfrm>
-          <a:prstGeom prst="rect">
-            <a:avLst/>
-          </a:prstGeom>
-          <a:noFill/>
-        </p:spPr>
-        <p:txBody>
-          <a:bodyPr wrap="square" rtlCol="0">
-            <a:spAutoFit/>
-          </a:bodyPr>
-          <a:lstStyle/>
           <a:p>
             <a:r>
               <a:rPr lang="en-US" sz="1200" dirty="0"/>
-              <a:t>Which is the most important when determining salary for players?  </a:t>
-            </a:r>
-          </a:p>
-          <a:p>
-            <a:endParaRPr lang="en-US" sz="1200" dirty="0"/>
-          </a:p>
-          <a:p>
-            <a:r>
-              <a:rPr lang="en-US" sz="1200" dirty="0"/>
-              <a:t>Based on our model, we can see that SO’s are the most significant indicator – a reflection of the ‘go big or go home’ hitting &amp; marketing approach of baseball since the 1998 Home Run Chase captivated the nation.</a:t>
+              <a:t>Surprisingly, this model indicates that SO’s are the most significant indicator of salary – the only statistic in this set that would be deemed a ‘negative’ on a player’s performance.  </a:t>
             </a:r>
           </a:p>
         </p:txBody>
@@ -4231,299 +5730,6 @@
     <p:extLst>
       <p:ext uri="{BB962C8B-B14F-4D97-AF65-F5344CB8AC3E}">
         <p14:creationId xmlns:p14="http://schemas.microsoft.com/office/powerpoint/2010/main" val="1211891194"/>
-      </p:ext>
-    </p:extLst>
-  </p:cSld>
-  <p:clrMapOvr>
-    <a:masterClrMapping/>
-  </p:clrMapOvr>
-</p:sld>
-</file>
-
-<file path=ppt/slides/slide7.xml><?xml version="1.0" encoding="utf-8"?>
-<p:sld xmlns:a="http://schemas.openxmlformats.org/drawingml/2006/main" xmlns:r="http://schemas.openxmlformats.org/officeDocument/2006/relationships" xmlns:p="http://schemas.openxmlformats.org/presentationml/2006/main">
-  <p:cSld>
-    <p:spTree>
-      <p:nvGrpSpPr>
-        <p:cNvPr id="1" name=""/>
-        <p:cNvGrpSpPr/>
-        <p:nvPr/>
-      </p:nvGrpSpPr>
-      <p:grpSpPr>
-        <a:xfrm>
-          <a:off x="0" y="0"/>
-          <a:ext cx="0" cy="0"/>
-          <a:chOff x="0" y="0"/>
-          <a:chExt cx="0" cy="0"/>
-        </a:xfrm>
-      </p:grpSpPr>
-      <p:sp>
-        <p:nvSpPr>
-          <p:cNvPr id="4098" name="Rectangle 2"/>
-          <p:cNvSpPr>
-            <a:spLocks noGrp="1" noChangeArrowheads="1"/>
-          </p:cNvSpPr>
-          <p:nvPr>
-            <p:ph type="title"/>
-          </p:nvPr>
-        </p:nvSpPr>
-        <p:spPr>
-          <a:xfrm>
-            <a:off x="2143125" y="1714500"/>
-            <a:ext cx="6480175" cy="649288"/>
-          </a:xfrm>
-        </p:spPr>
-        <p:txBody>
-          <a:bodyPr/>
-          <a:lstStyle/>
-          <a:p>
-            <a:pPr algn="r" eaLnBrk="1" hangingPunct="1"/>
-            <a:r>
-              <a:rPr lang="en" sz="2400" dirty="0">
-                <a:solidFill>
-                  <a:schemeClr val="accent2"/>
-                </a:solidFill>
-              </a:rPr>
-              <a:t>Asking Questions</a:t>
-            </a:r>
-            <a:endParaRPr lang="uk-UA" sz="3200" dirty="0">
-              <a:solidFill>
-                <a:schemeClr val="accent2"/>
-              </a:solidFill>
-            </a:endParaRPr>
-          </a:p>
-        </p:txBody>
-      </p:sp>
-      <p:sp>
-        <p:nvSpPr>
-          <p:cNvPr id="4" name="TextBox 3">
-            <a:extLst>
-              <a:ext uri="{FF2B5EF4-FFF2-40B4-BE49-F238E27FC236}">
-                <a16:creationId xmlns:a16="http://schemas.microsoft.com/office/drawing/2014/main" id="{129137F0-217C-400B-B5D8-7EA6493D90B5}"/>
-              </a:ext>
-            </a:extLst>
-          </p:cNvPr>
-          <p:cNvSpPr txBox="1"/>
-          <p:nvPr/>
-        </p:nvSpPr>
-        <p:spPr>
-          <a:xfrm>
-            <a:off x="417667" y="2768720"/>
-            <a:ext cx="3934374" cy="1569660"/>
-          </a:xfrm>
-          <a:prstGeom prst="rect">
-            <a:avLst/>
-          </a:prstGeom>
-          <a:noFill/>
-        </p:spPr>
-        <p:txBody>
-          <a:bodyPr wrap="square" rtlCol="0">
-            <a:spAutoFit/>
-          </a:bodyPr>
-          <a:lstStyle/>
-          <a:p>
-            <a:r>
-              <a:rPr lang="en-US" sz="1200" dirty="0"/>
-              <a:t>Just because SO’s are the biggest indicator that predicts salary in our model, doesn’t mean that a player with the most SO’s should earn the highest pay.  </a:t>
-            </a:r>
-          </a:p>
-          <a:p>
-            <a:endParaRPr lang="en-US" sz="1200" dirty="0"/>
-          </a:p>
-          <a:p>
-            <a:r>
-              <a:rPr lang="en-US" sz="1200" dirty="0"/>
-              <a:t>Slugging Percentage (SLG) is the reflection of Strike-Outs in the game’s highest paid players.  </a:t>
-            </a:r>
-          </a:p>
-          <a:p>
-            <a:endParaRPr lang="en-US" sz="1200" dirty="0"/>
-          </a:p>
-          <a:p>
-            <a:endParaRPr lang="en-US" sz="1200" dirty="0"/>
-          </a:p>
-        </p:txBody>
-      </p:sp>
-      <p:sp>
-        <p:nvSpPr>
-          <p:cNvPr id="2" name="TextBox 1">
-            <a:extLst>
-              <a:ext uri="{FF2B5EF4-FFF2-40B4-BE49-F238E27FC236}">
-                <a16:creationId xmlns:a16="http://schemas.microsoft.com/office/drawing/2014/main" id="{690B3770-BB54-4B16-B2BB-A1F0F3734539}"/>
-              </a:ext>
-            </a:extLst>
-          </p:cNvPr>
-          <p:cNvSpPr txBox="1"/>
-          <p:nvPr/>
-        </p:nvSpPr>
-        <p:spPr>
-          <a:xfrm>
-            <a:off x="556938" y="4165833"/>
-            <a:ext cx="3172374" cy="369332"/>
-          </a:xfrm>
-          <a:prstGeom prst="rect">
-            <a:avLst/>
-          </a:prstGeom>
-          <a:noFill/>
-        </p:spPr>
-        <p:txBody>
-          <a:bodyPr wrap="square" rtlCol="0">
-            <a:spAutoFit/>
-          </a:bodyPr>
-          <a:lstStyle/>
-          <a:p>
-            <a:r>
-              <a:rPr lang="en-US" dirty="0"/>
-              <a:t>SLG = Total Bases / At-Bats</a:t>
-            </a:r>
-          </a:p>
-        </p:txBody>
-      </p:sp>
-      <p:sp>
-        <p:nvSpPr>
-          <p:cNvPr id="7" name="TextBox 6">
-            <a:extLst>
-              <a:ext uri="{FF2B5EF4-FFF2-40B4-BE49-F238E27FC236}">
-                <a16:creationId xmlns:a16="http://schemas.microsoft.com/office/drawing/2014/main" id="{31019992-6E6F-463B-9DEB-A73AAE25A9E6}"/>
-              </a:ext>
-            </a:extLst>
-          </p:cNvPr>
-          <p:cNvSpPr txBox="1"/>
-          <p:nvPr/>
-        </p:nvSpPr>
-        <p:spPr>
-          <a:xfrm>
-            <a:off x="395013" y="4708045"/>
-            <a:ext cx="4419600" cy="646331"/>
-          </a:xfrm>
-          <a:prstGeom prst="rect">
-            <a:avLst/>
-          </a:prstGeom>
-          <a:noFill/>
-        </p:spPr>
-        <p:txBody>
-          <a:bodyPr wrap="square" rtlCol="0">
-            <a:spAutoFit/>
-          </a:bodyPr>
-          <a:lstStyle/>
-          <a:p>
-            <a:r>
-              <a:rPr lang="en-US" dirty="0"/>
-              <a:t>Total Bases = (Singles) + (2 x Doubles) + (3 x Triples) + (4 x Home Runs)</a:t>
-            </a:r>
-          </a:p>
-        </p:txBody>
-      </p:sp>
-      <p:sp>
-        <p:nvSpPr>
-          <p:cNvPr id="9" name="TextBox 8">
-            <a:extLst>
-              <a:ext uri="{FF2B5EF4-FFF2-40B4-BE49-F238E27FC236}">
-                <a16:creationId xmlns:a16="http://schemas.microsoft.com/office/drawing/2014/main" id="{4C89C8A8-819D-448A-ADF7-50DE7253582F}"/>
-              </a:ext>
-            </a:extLst>
-          </p:cNvPr>
-          <p:cNvSpPr txBox="1"/>
-          <p:nvPr/>
-        </p:nvSpPr>
-        <p:spPr>
-          <a:xfrm>
-            <a:off x="304800" y="5551161"/>
-            <a:ext cx="3934374" cy="1384995"/>
-          </a:xfrm>
-          <a:prstGeom prst="rect">
-            <a:avLst/>
-          </a:prstGeom>
-          <a:noFill/>
-        </p:spPr>
-        <p:txBody>
-          <a:bodyPr wrap="square" rtlCol="0">
-            <a:spAutoFit/>
-          </a:bodyPr>
-          <a:lstStyle/>
-          <a:p>
-            <a:r>
-              <a:rPr lang="en-US" sz="1200" dirty="0"/>
-              <a:t>In this scatterplot, we can see that the players on the right side – who have the most SO’s – have larger circles than the players on the left.  This means they have larger salaries.  This tracks with teams wanting to pay players with the most HR-potential large salaries.</a:t>
-            </a:r>
-          </a:p>
-          <a:p>
-            <a:endParaRPr lang="en-US" sz="1200" dirty="0"/>
-          </a:p>
-          <a:p>
-            <a:endParaRPr lang="en-US" sz="1200" dirty="0"/>
-          </a:p>
-        </p:txBody>
-      </p:sp>
-      <p:pic>
-        <p:nvPicPr>
-          <p:cNvPr id="10" name="Picture 9">
-            <a:extLst>
-              <a:ext uri="{FF2B5EF4-FFF2-40B4-BE49-F238E27FC236}">
-                <a16:creationId xmlns:a16="http://schemas.microsoft.com/office/drawing/2014/main" id="{6EEDDBEC-22A1-4F52-BE7D-A8E79FACD3A4}"/>
-              </a:ext>
-            </a:extLst>
-          </p:cNvPr>
-          <p:cNvPicPr>
-            <a:picLocks noChangeAspect="1"/>
-          </p:cNvPicPr>
-          <p:nvPr/>
-        </p:nvPicPr>
-        <p:blipFill>
-          <a:blip r:embed="rId3"/>
-          <a:stretch>
-            <a:fillRect/>
-          </a:stretch>
-        </p:blipFill>
-        <p:spPr>
-          <a:xfrm>
-            <a:off x="4724400" y="2590800"/>
-            <a:ext cx="4352039" cy="2921083"/>
-          </a:xfrm>
-          <a:prstGeom prst="rect">
-            <a:avLst/>
-          </a:prstGeom>
-        </p:spPr>
-      </p:pic>
-      <p:sp>
-        <p:nvSpPr>
-          <p:cNvPr id="11" name="TextBox 10">
-            <a:extLst>
-              <a:ext uri="{FF2B5EF4-FFF2-40B4-BE49-F238E27FC236}">
-                <a16:creationId xmlns:a16="http://schemas.microsoft.com/office/drawing/2014/main" id="{D1EF8E3F-080C-4D07-9506-1B5F3B668109}"/>
-              </a:ext>
-            </a:extLst>
-          </p:cNvPr>
-          <p:cNvSpPr txBox="1"/>
-          <p:nvPr/>
-        </p:nvSpPr>
-        <p:spPr>
-          <a:xfrm>
-            <a:off x="5562600" y="5638800"/>
-            <a:ext cx="2971800" cy="646331"/>
-          </a:xfrm>
-          <a:prstGeom prst="rect">
-            <a:avLst/>
-          </a:prstGeom>
-          <a:noFill/>
-        </p:spPr>
-        <p:txBody>
-          <a:bodyPr wrap="square" rtlCol="0">
-            <a:spAutoFit/>
-          </a:bodyPr>
-          <a:lstStyle/>
-          <a:p>
-            <a:r>
-              <a:rPr lang="en-US" dirty="0"/>
-              <a:t>Salary as a function of SLG% vs. SO (1998-2016)</a:t>
-            </a:r>
-          </a:p>
-        </p:txBody>
-      </p:sp>
-    </p:spTree>
-    <p:extLst>
-      <p:ext uri="{BB962C8B-B14F-4D97-AF65-F5344CB8AC3E}">
-        <p14:creationId xmlns:p14="http://schemas.microsoft.com/office/powerpoint/2010/main" val="3272326956"/>
       </p:ext>
     </p:extLst>
   </p:cSld>

</xml_diff>